<commit_message>
adjusted fig 1 font size and legends
</commit_message>
<xml_diff>
--- a/figs/plot1.pptx
+++ b/figs/plot1.pptx
@@ -199,7 +199,7 @@
           <a:p>
             <a:fld id="{7ED6ADED-0D44-564F-BB4B-330E28FA8488}" type="datetimeFigureOut">
               <a:rPr lang="en-US" smtClean="0"/>
-              <a:t>5/6/20</a:t>
+              <a:t>6/1/20</a:t>
             </a:fld>
             <a:endParaRPr lang="en-US"/>
           </a:p>
@@ -784,7 +784,7 @@
           <a:p>
             <a:fld id="{3C151F4F-B130-E04C-A685-49492BE9A170}" type="datetimeFigureOut">
               <a:rPr lang="en-US" smtClean="0"/>
-              <a:t>5/6/20</a:t>
+              <a:t>6/1/20</a:t>
             </a:fld>
             <a:endParaRPr lang="en-US"/>
           </a:p>
@@ -984,7 +984,7 @@
           <a:p>
             <a:fld id="{3C151F4F-B130-E04C-A685-49492BE9A170}" type="datetimeFigureOut">
               <a:rPr lang="en-US" smtClean="0"/>
-              <a:t>5/6/20</a:t>
+              <a:t>6/1/20</a:t>
             </a:fld>
             <a:endParaRPr lang="en-US"/>
           </a:p>
@@ -1194,7 +1194,7 @@
           <a:p>
             <a:fld id="{3C151F4F-B130-E04C-A685-49492BE9A170}" type="datetimeFigureOut">
               <a:rPr lang="en-US" smtClean="0"/>
-              <a:t>5/6/20</a:t>
+              <a:t>6/1/20</a:t>
             </a:fld>
             <a:endParaRPr lang="en-US"/>
           </a:p>
@@ -1394,7 +1394,7 @@
           <a:p>
             <a:fld id="{3C151F4F-B130-E04C-A685-49492BE9A170}" type="datetimeFigureOut">
               <a:rPr lang="en-US" smtClean="0"/>
-              <a:t>5/6/20</a:t>
+              <a:t>6/1/20</a:t>
             </a:fld>
             <a:endParaRPr lang="en-US"/>
           </a:p>
@@ -1670,7 +1670,7 @@
           <a:p>
             <a:fld id="{3C151F4F-B130-E04C-A685-49492BE9A170}" type="datetimeFigureOut">
               <a:rPr lang="en-US" smtClean="0"/>
-              <a:t>5/6/20</a:t>
+              <a:t>6/1/20</a:t>
             </a:fld>
             <a:endParaRPr lang="en-US"/>
           </a:p>
@@ -1938,7 +1938,7 @@
           <a:p>
             <a:fld id="{3C151F4F-B130-E04C-A685-49492BE9A170}" type="datetimeFigureOut">
               <a:rPr lang="en-US" smtClean="0"/>
-              <a:t>5/6/20</a:t>
+              <a:t>6/1/20</a:t>
             </a:fld>
             <a:endParaRPr lang="en-US"/>
           </a:p>
@@ -2353,7 +2353,7 @@
           <a:p>
             <a:fld id="{3C151F4F-B130-E04C-A685-49492BE9A170}" type="datetimeFigureOut">
               <a:rPr lang="en-US" smtClean="0"/>
-              <a:t>5/6/20</a:t>
+              <a:t>6/1/20</a:t>
             </a:fld>
             <a:endParaRPr lang="en-US"/>
           </a:p>
@@ -2495,7 +2495,7 @@
           <a:p>
             <a:fld id="{3C151F4F-B130-E04C-A685-49492BE9A170}" type="datetimeFigureOut">
               <a:rPr lang="en-US" smtClean="0"/>
-              <a:t>5/6/20</a:t>
+              <a:t>6/1/20</a:t>
             </a:fld>
             <a:endParaRPr lang="en-US"/>
           </a:p>
@@ -2608,7 +2608,7 @@
           <a:p>
             <a:fld id="{3C151F4F-B130-E04C-A685-49492BE9A170}" type="datetimeFigureOut">
               <a:rPr lang="en-US" smtClean="0"/>
-              <a:t>5/6/20</a:t>
+              <a:t>6/1/20</a:t>
             </a:fld>
             <a:endParaRPr lang="en-US"/>
           </a:p>
@@ -2921,7 +2921,7 @@
           <a:p>
             <a:fld id="{3C151F4F-B130-E04C-A685-49492BE9A170}" type="datetimeFigureOut">
               <a:rPr lang="en-US" smtClean="0"/>
-              <a:t>5/6/20</a:t>
+              <a:t>6/1/20</a:t>
             </a:fld>
             <a:endParaRPr lang="en-US"/>
           </a:p>
@@ -3210,7 +3210,7 @@
           <a:p>
             <a:fld id="{3C151F4F-B130-E04C-A685-49492BE9A170}" type="datetimeFigureOut">
               <a:rPr lang="en-US" smtClean="0"/>
-              <a:t>5/6/20</a:t>
+              <a:t>6/1/20</a:t>
             </a:fld>
             <a:endParaRPr lang="en-US"/>
           </a:p>
@@ -3453,7 +3453,7 @@
           <a:p>
             <a:fld id="{3C151F4F-B130-E04C-A685-49492BE9A170}" type="datetimeFigureOut">
               <a:rPr lang="en-US" smtClean="0"/>
-              <a:t>5/6/20</a:t>
+              <a:t>6/1/20</a:t>
             </a:fld>
             <a:endParaRPr lang="en-US"/>
           </a:p>
@@ -5981,8 +5981,8 @@
             <a:p>
               <a:pPr algn="ctr"/>
               <a:r>
-                <a:rPr lang="en-US" altLang="zh-CN" sz="1400" dirty="0"/>
-                <a:t>FLTSA</a:t>
+                <a:rPr lang="en-US" altLang="zh-CN" sz="1400"/>
+                <a:t>FLAMES</a:t>
               </a:r>
               <a:endParaRPr lang="en-US" sz="1400" dirty="0"/>
             </a:p>

</xml_diff>

<commit_message>
moved folders and renamed scripts
</commit_message>
<xml_diff>
--- a/figs/plot1.pptx
+++ b/figs/plot1.pptx
@@ -199,7 +199,7 @@
           <a:p>
             <a:fld id="{7ED6ADED-0D44-564F-BB4B-330E28FA8488}" type="datetimeFigureOut">
               <a:rPr lang="en-US" smtClean="0"/>
-              <a:t>6/11/20</a:t>
+              <a:t>6/14/20</a:t>
             </a:fld>
             <a:endParaRPr lang="en-US"/>
           </a:p>
@@ -784,7 +784,7 @@
           <a:p>
             <a:fld id="{3C151F4F-B130-E04C-A685-49492BE9A170}" type="datetimeFigureOut">
               <a:rPr lang="en-US" smtClean="0"/>
-              <a:t>6/11/20</a:t>
+              <a:t>6/14/20</a:t>
             </a:fld>
             <a:endParaRPr lang="en-US"/>
           </a:p>
@@ -984,7 +984,7 @@
           <a:p>
             <a:fld id="{3C151F4F-B130-E04C-A685-49492BE9A170}" type="datetimeFigureOut">
               <a:rPr lang="en-US" smtClean="0"/>
-              <a:t>6/11/20</a:t>
+              <a:t>6/14/20</a:t>
             </a:fld>
             <a:endParaRPr lang="en-US"/>
           </a:p>
@@ -1194,7 +1194,7 @@
           <a:p>
             <a:fld id="{3C151F4F-B130-E04C-A685-49492BE9A170}" type="datetimeFigureOut">
               <a:rPr lang="en-US" smtClean="0"/>
-              <a:t>6/11/20</a:t>
+              <a:t>6/14/20</a:t>
             </a:fld>
             <a:endParaRPr lang="en-US"/>
           </a:p>
@@ -1394,7 +1394,7 @@
           <a:p>
             <a:fld id="{3C151F4F-B130-E04C-A685-49492BE9A170}" type="datetimeFigureOut">
               <a:rPr lang="en-US" smtClean="0"/>
-              <a:t>6/11/20</a:t>
+              <a:t>6/14/20</a:t>
             </a:fld>
             <a:endParaRPr lang="en-US"/>
           </a:p>
@@ -1670,7 +1670,7 @@
           <a:p>
             <a:fld id="{3C151F4F-B130-E04C-A685-49492BE9A170}" type="datetimeFigureOut">
               <a:rPr lang="en-US" smtClean="0"/>
-              <a:t>6/11/20</a:t>
+              <a:t>6/14/20</a:t>
             </a:fld>
             <a:endParaRPr lang="en-US"/>
           </a:p>
@@ -1938,7 +1938,7 @@
           <a:p>
             <a:fld id="{3C151F4F-B130-E04C-A685-49492BE9A170}" type="datetimeFigureOut">
               <a:rPr lang="en-US" smtClean="0"/>
-              <a:t>6/11/20</a:t>
+              <a:t>6/14/20</a:t>
             </a:fld>
             <a:endParaRPr lang="en-US"/>
           </a:p>
@@ -2353,7 +2353,7 @@
           <a:p>
             <a:fld id="{3C151F4F-B130-E04C-A685-49492BE9A170}" type="datetimeFigureOut">
               <a:rPr lang="en-US" smtClean="0"/>
-              <a:t>6/11/20</a:t>
+              <a:t>6/14/20</a:t>
             </a:fld>
             <a:endParaRPr lang="en-US"/>
           </a:p>
@@ -2495,7 +2495,7 @@
           <a:p>
             <a:fld id="{3C151F4F-B130-E04C-A685-49492BE9A170}" type="datetimeFigureOut">
               <a:rPr lang="en-US" smtClean="0"/>
-              <a:t>6/11/20</a:t>
+              <a:t>6/14/20</a:t>
             </a:fld>
             <a:endParaRPr lang="en-US"/>
           </a:p>
@@ -2608,7 +2608,7 @@
           <a:p>
             <a:fld id="{3C151F4F-B130-E04C-A685-49492BE9A170}" type="datetimeFigureOut">
               <a:rPr lang="en-US" smtClean="0"/>
-              <a:t>6/11/20</a:t>
+              <a:t>6/14/20</a:t>
             </a:fld>
             <a:endParaRPr lang="en-US"/>
           </a:p>
@@ -2921,7 +2921,7 @@
           <a:p>
             <a:fld id="{3C151F4F-B130-E04C-A685-49492BE9A170}" type="datetimeFigureOut">
               <a:rPr lang="en-US" smtClean="0"/>
-              <a:t>6/11/20</a:t>
+              <a:t>6/14/20</a:t>
             </a:fld>
             <a:endParaRPr lang="en-US"/>
           </a:p>
@@ -3210,7 +3210,7 @@
           <a:p>
             <a:fld id="{3C151F4F-B130-E04C-A685-49492BE9A170}" type="datetimeFigureOut">
               <a:rPr lang="en-US" smtClean="0"/>
-              <a:t>6/11/20</a:t>
+              <a:t>6/14/20</a:t>
             </a:fld>
             <a:endParaRPr lang="en-US"/>
           </a:p>
@@ -3453,7 +3453,7 @@
           <a:p>
             <a:fld id="{3C151F4F-B130-E04C-A685-49492BE9A170}" type="datetimeFigureOut">
               <a:rPr lang="en-US" smtClean="0"/>
-              <a:t>6/11/20</a:t>
+              <a:t>6/14/20</a:t>
             </a:fld>
             <a:endParaRPr lang="en-US"/>
           </a:p>
@@ -5002,7 +5002,7 @@
         </p:nvSpPr>
         <p:spPr>
           <a:xfrm>
-            <a:off x="114300" y="3766263"/>
+            <a:off x="114300" y="3770167"/>
             <a:ext cx="11963400" cy="2134411"/>
           </a:xfrm>
           <a:prstGeom prst="rect">
@@ -5252,10 +5252,10 @@
         </p:nvGrpSpPr>
         <p:grpSpPr>
           <a:xfrm>
-            <a:off x="152348" y="88124"/>
-            <a:ext cx="4746159" cy="6566219"/>
-            <a:chOff x="1153790" y="88124"/>
-            <a:chExt cx="4746159" cy="6566219"/>
+            <a:off x="152340" y="95460"/>
+            <a:ext cx="4745368" cy="6571606"/>
+            <a:chOff x="1153782" y="95460"/>
+            <a:chExt cx="4745368" cy="6571606"/>
           </a:xfrm>
         </p:grpSpPr>
         <p:sp>
@@ -5272,8 +5272,8 @@
           </p:nvSpPr>
           <p:spPr>
             <a:xfrm>
-              <a:off x="2611396" y="88124"/>
-              <a:ext cx="1838698" cy="422055"/>
+              <a:off x="2420571" y="95460"/>
+              <a:ext cx="2241973" cy="422055"/>
             </a:xfrm>
             <a:prstGeom prst="rect">
               <a:avLst/>
@@ -5334,7 +5334,7 @@
           </p:nvSpPr>
           <p:spPr>
             <a:xfrm>
-              <a:off x="1153790" y="5051997"/>
+              <a:off x="1153790" y="5091902"/>
               <a:ext cx="2262771" cy="474914"/>
             </a:xfrm>
             <a:prstGeom prst="rect">
@@ -5393,7 +5393,7 @@
           </p:nvSpPr>
           <p:spPr>
             <a:xfrm>
-              <a:off x="3637176" y="5079086"/>
+              <a:off x="3632368" y="5091902"/>
               <a:ext cx="2262771" cy="474914"/>
             </a:xfrm>
             <a:prstGeom prst="rect">
@@ -5452,7 +5452,7 @@
           </p:nvSpPr>
           <p:spPr>
             <a:xfrm>
-              <a:off x="1153790" y="6200813"/>
+              <a:off x="1153782" y="6217524"/>
               <a:ext cx="2258760" cy="443452"/>
             </a:xfrm>
             <a:prstGeom prst="rect">
@@ -5511,7 +5511,7 @@
           </p:nvSpPr>
           <p:spPr>
             <a:xfrm>
-              <a:off x="3637176" y="6204801"/>
+              <a:off x="3632368" y="6217524"/>
               <a:ext cx="2262773" cy="449542"/>
             </a:xfrm>
             <a:prstGeom prst="rect">
@@ -5708,7 +5708,7 @@
           </p:nvSpPr>
           <p:spPr>
             <a:xfrm>
-              <a:off x="1153790" y="4150119"/>
+              <a:off x="1153782" y="4177208"/>
               <a:ext cx="2258752" cy="467679"/>
             </a:xfrm>
             <a:prstGeom prst="rect">
@@ -5787,8 +5787,8 @@
           </p:nvCxnSpPr>
           <p:spPr>
             <a:xfrm>
-              <a:off x="2283166" y="4617798"/>
-              <a:ext cx="2010" cy="434199"/>
+              <a:off x="2283158" y="4644887"/>
+              <a:ext cx="2018" cy="447015"/>
             </a:xfrm>
             <a:prstGeom prst="straightConnector1">
               <a:avLst/>
@@ -5830,12 +5830,12 @@
           </p:nvCxnSpPr>
           <p:spPr>
             <a:xfrm rot="5400000">
-              <a:off x="1811775" y="2420329"/>
-              <a:ext cx="2201182" cy="1258399"/>
+              <a:off x="1798227" y="2433869"/>
+              <a:ext cx="2228271" cy="1258407"/>
             </a:xfrm>
             <a:prstGeom prst="bentConnector3">
               <a:avLst>
-                <a:gd name="adj1" fmla="val 16318"/>
+                <a:gd name="adj1" fmla="val 16236"/>
               </a:avLst>
             </a:prstGeom>
             <a:ln>
@@ -5875,8 +5875,8 @@
           </p:nvCxnSpPr>
           <p:spPr>
             <a:xfrm flipH="1">
-              <a:off x="2283170" y="5526911"/>
-              <a:ext cx="2006" cy="673902"/>
+              <a:off x="2283162" y="5566816"/>
+              <a:ext cx="2014" cy="650708"/>
             </a:xfrm>
             <a:prstGeom prst="straightConnector1">
               <a:avLst/>
@@ -5917,9 +5917,9 @@
             <p:nvPr/>
           </p:nvCxnSpPr>
           <p:spPr>
-            <a:xfrm>
-              <a:off x="4765763" y="4652122"/>
-              <a:ext cx="2799" cy="426964"/>
+            <a:xfrm flipH="1">
+              <a:off x="4763754" y="4652122"/>
+              <a:ext cx="2009" cy="439780"/>
             </a:xfrm>
             <a:prstGeom prst="straightConnector1">
               <a:avLst/>
@@ -6179,8 +6179,8 @@
           </p:nvCxnSpPr>
           <p:spPr>
             <a:xfrm>
-              <a:off x="3530745" y="510179"/>
-              <a:ext cx="10814" cy="346674"/>
+              <a:off x="3541558" y="517515"/>
+              <a:ext cx="1" cy="339338"/>
             </a:xfrm>
             <a:prstGeom prst="straightConnector1">
               <a:avLst/>
@@ -6265,8 +6265,8 @@
           </p:nvCxnSpPr>
           <p:spPr>
             <a:xfrm>
-              <a:off x="4768562" y="5554000"/>
-              <a:ext cx="1" cy="650801"/>
+              <a:off x="4763754" y="5566816"/>
+              <a:ext cx="1" cy="650708"/>
             </a:xfrm>
             <a:prstGeom prst="straightConnector1">
               <a:avLst/>
@@ -6305,10 +6305,10 @@
         </p:nvGrpSpPr>
         <p:grpSpPr>
           <a:xfrm>
-            <a:off x="5055018" y="88124"/>
-            <a:ext cx="4589244" cy="6572852"/>
-            <a:chOff x="5055018" y="88124"/>
-            <a:chExt cx="4589244" cy="6572852"/>
+            <a:off x="5047797" y="95460"/>
+            <a:ext cx="4596465" cy="6565516"/>
+            <a:chOff x="5047797" y="95460"/>
+            <a:chExt cx="4596465" cy="6565516"/>
           </a:xfrm>
         </p:grpSpPr>
         <p:sp>
@@ -6325,8 +6325,8 @@
           </p:nvSpPr>
           <p:spPr>
             <a:xfrm>
-              <a:off x="6398439" y="88124"/>
-              <a:ext cx="1838698" cy="422055"/>
+              <a:off x="6166921" y="95460"/>
+              <a:ext cx="2262767" cy="422055"/>
             </a:xfrm>
             <a:prstGeom prst="rect">
               <a:avLst/>
@@ -6402,7 +6402,7 @@
           </p:nvSpPr>
           <p:spPr>
             <a:xfrm>
-              <a:off x="5055018" y="5079545"/>
+              <a:off x="5047797" y="5091902"/>
               <a:ext cx="2262774" cy="474914"/>
             </a:xfrm>
             <a:prstGeom prst="rect">
@@ -6526,7 +6526,7 @@
           </p:nvSpPr>
           <p:spPr>
             <a:xfrm>
-              <a:off x="6186405" y="4121921"/>
+              <a:off x="6166921" y="4180825"/>
               <a:ext cx="2262767" cy="467679"/>
             </a:xfrm>
             <a:prstGeom prst="rect">
@@ -6605,8 +6605,8 @@
           </p:nvCxnSpPr>
           <p:spPr>
             <a:xfrm>
-              <a:off x="6186405" y="5554459"/>
-              <a:ext cx="2" cy="663065"/>
+              <a:off x="6179184" y="5566816"/>
+              <a:ext cx="7223" cy="650708"/>
             </a:xfrm>
             <a:prstGeom prst="straightConnector1">
               <a:avLst/>
@@ -6648,8 +6648,8 @@
           </p:nvCxnSpPr>
           <p:spPr>
             <a:xfrm>
-              <a:off x="7317788" y="510179"/>
-              <a:ext cx="1" cy="3611742"/>
+              <a:off x="7298305" y="517515"/>
+              <a:ext cx="0" cy="3663310"/>
             </a:xfrm>
             <a:prstGeom prst="straightConnector1">
               <a:avLst/>
@@ -6691,8 +6691,8 @@
           </p:nvCxnSpPr>
           <p:spPr>
             <a:xfrm rot="16200000" flipH="1">
-              <a:off x="7664181" y="4243208"/>
-              <a:ext cx="502302" cy="1195086"/>
+              <a:off x="7683891" y="4262918"/>
+              <a:ext cx="443398" cy="1214570"/>
             </a:xfrm>
             <a:prstGeom prst="bentConnector3">
               <a:avLst>
@@ -6903,8 +6903,8 @@
           </p:nvCxnSpPr>
           <p:spPr>
             <a:xfrm rot="5400000">
-              <a:off x="6507125" y="4268880"/>
-              <a:ext cx="489945" cy="1131384"/>
+              <a:off x="6517046" y="4310643"/>
+              <a:ext cx="443398" cy="1119121"/>
             </a:xfrm>
             <a:prstGeom prst="bentConnector3">
               <a:avLst>

</xml_diff>